<commit_message>
fix: Added more photos.
</commit_message>
<xml_diff>
--- a/An Introduction to Functional 3d Printer Design.pptx
+++ b/An Introduction to Functional 3d Printer Design.pptx
@@ -4794,9 +4794,9 @@
       </p:pic>
       <p:pic>
         <p:nvPicPr>
-          <p:cNvPr id="1028" name="Picture 4" descr="https://cdn-images-1.medium.com/max/600/1*m1kZe-vWBcufmOKlSW9pUA.jpeg"/>
+          <p:cNvPr id="5" name="Picture 4"/>
           <p:cNvPicPr>
-            <a:picLocks noChangeAspect="1" noChangeArrowheads="1"/>
+            <a:picLocks noChangeAspect="1"/>
           </p:cNvPicPr>
           <p:nvPr/>
         </p:nvPicPr>
@@ -4808,29 +4808,18 @@
               </a:ext>
             </a:extLst>
           </a:blip>
-          <a:srcRect/>
           <a:stretch>
             <a:fillRect/>
           </a:stretch>
         </p:blipFill>
-        <p:spPr bwMode="auto">
+        <p:spPr>
           <a:xfrm>
-            <a:off x="6400800" y="1371600"/>
-            <a:ext cx="2438400" cy="1828800"/>
+            <a:off x="6248400" y="2743200"/>
+            <a:ext cx="2667000" cy="2000553"/>
           </a:xfrm>
           <a:prstGeom prst="rect">
             <a:avLst/>
           </a:prstGeom>
-          <a:noFill/>
-          <a:extLst>
-            <a:ext uri="{909E8E84-426E-40DD-AFC4-6F175D3DCCD1}">
-              <a14:hiddenFill xmlns:a14="http://schemas.microsoft.com/office/drawing/2010/main">
-                <a:solidFill>
-                  <a:srgbClr val="FFFFFF"/>
-                </a:solidFill>
-              </a14:hiddenFill>
-            </a:ext>
-          </a:extLst>
         </p:spPr>
       </p:pic>
       <p:pic>
@@ -4855,7 +4844,7 @@
         </p:blipFill>
         <p:spPr>
           <a:xfrm>
-            <a:off x="4572000" y="2971800"/>
+            <a:off x="4205434" y="1676400"/>
             <a:ext cx="2743200" cy="2057400"/>
           </a:xfrm>
           <a:prstGeom prst="rect">
@@ -5209,8 +5198,8 @@
         </p:blipFill>
         <p:spPr bwMode="auto">
           <a:xfrm>
-            <a:off x="533400" y="4114800"/>
-            <a:ext cx="3429000" cy="2571750"/>
+            <a:off x="515273" y="4758164"/>
+            <a:ext cx="2590800" cy="1943100"/>
           </a:xfrm>
           <a:prstGeom prst="rect">
             <a:avLst/>
@@ -5332,8 +5321,131 @@
         </p:blipFill>
         <p:spPr bwMode="auto">
           <a:xfrm>
-            <a:off x="914400" y="1638300"/>
-            <a:ext cx="3200400" cy="2400300"/>
+            <a:off x="457200" y="1371600"/>
+            <a:ext cx="2054081" cy="1540561"/>
+          </a:xfrm>
+          <a:prstGeom prst="rect">
+            <a:avLst/>
+          </a:prstGeom>
+          <a:noFill/>
+          <a:extLst>
+            <a:ext uri="{909E8E84-426E-40DD-AFC4-6F175D3DCCD1}">
+              <a14:hiddenFill xmlns:a14="http://schemas.microsoft.com/office/drawing/2010/main">
+                <a:solidFill>
+                  <a:srgbClr val="FFFFFF"/>
+                </a:solidFill>
+              </a14:hiddenFill>
+            </a:ext>
+          </a:extLst>
+        </p:spPr>
+      </p:pic>
+      <p:pic>
+        <p:nvPicPr>
+          <p:cNvPr id="1026" name="Picture 2" descr="https://cdn-images-1.medium.com/max/800/1*8hjI7r4YPUz9cikxfC0bgw.png"/>
+          <p:cNvPicPr>
+            <a:picLocks noChangeAspect="1" noChangeArrowheads="1"/>
+          </p:cNvPicPr>
+          <p:nvPr/>
+        </p:nvPicPr>
+        <p:blipFill>
+          <a:blip r:embed="rId6" cstate="print">
+            <a:extLst>
+              <a:ext uri="{28A0092B-C50C-407E-A947-70E740481C1C}">
+                <a14:useLocalDpi xmlns:a14="http://schemas.microsoft.com/office/drawing/2010/main" val="0"/>
+              </a:ext>
+            </a:extLst>
+          </a:blip>
+          <a:srcRect/>
+          <a:stretch>
+            <a:fillRect/>
+          </a:stretch>
+        </p:blipFill>
+        <p:spPr bwMode="auto">
+          <a:xfrm>
+            <a:off x="2743200" y="1405840"/>
+            <a:ext cx="1285875" cy="1413881"/>
+          </a:xfrm>
+          <a:prstGeom prst="rect">
+            <a:avLst/>
+          </a:prstGeom>
+          <a:noFill/>
+          <a:extLst>
+            <a:ext uri="{909E8E84-426E-40DD-AFC4-6F175D3DCCD1}">
+              <a14:hiddenFill xmlns:a14="http://schemas.microsoft.com/office/drawing/2010/main">
+                <a:solidFill>
+                  <a:srgbClr val="FFFFFF"/>
+                </a:solidFill>
+              </a14:hiddenFill>
+            </a:ext>
+          </a:extLst>
+        </p:spPr>
+      </p:pic>
+      <p:pic>
+        <p:nvPicPr>
+          <p:cNvPr id="1028" name="Picture 4" descr="https://cdn-images-1.medium.com/max/1200/1*uvMvLarrMYNJR3VrIYGjhA.png"/>
+          <p:cNvPicPr>
+            <a:picLocks noChangeAspect="1" noChangeArrowheads="1"/>
+          </p:cNvPicPr>
+          <p:nvPr/>
+        </p:nvPicPr>
+        <p:blipFill>
+          <a:blip r:embed="rId7" cstate="print">
+            <a:extLst>
+              <a:ext uri="{28A0092B-C50C-407E-A947-70E740481C1C}">
+                <a14:useLocalDpi xmlns:a14="http://schemas.microsoft.com/office/drawing/2010/main" val="0"/>
+              </a:ext>
+            </a:extLst>
+          </a:blip>
+          <a:srcRect/>
+          <a:stretch>
+            <a:fillRect/>
+          </a:stretch>
+        </p:blipFill>
+        <p:spPr bwMode="auto">
+          <a:xfrm>
+            <a:off x="533400" y="2986649"/>
+            <a:ext cx="1828800" cy="1570703"/>
+          </a:xfrm>
+          <a:prstGeom prst="rect">
+            <a:avLst/>
+          </a:prstGeom>
+          <a:noFill/>
+          <a:extLst>
+            <a:ext uri="{909E8E84-426E-40DD-AFC4-6F175D3DCCD1}">
+              <a14:hiddenFill xmlns:a14="http://schemas.microsoft.com/office/drawing/2010/main">
+                <a:solidFill>
+                  <a:srgbClr val="FFFFFF"/>
+                </a:solidFill>
+              </a14:hiddenFill>
+            </a:ext>
+          </a:extLst>
+        </p:spPr>
+      </p:pic>
+      <p:pic>
+        <p:nvPicPr>
+          <p:cNvPr id="1034" name="Picture 10" descr="https://cdn-images-1.medium.com/max/1600/1*Y0nQSELgkpw2vvTGjvSlIA.jpeg"/>
+          <p:cNvPicPr>
+            <a:picLocks noChangeAspect="1" noChangeArrowheads="1"/>
+          </p:cNvPicPr>
+          <p:nvPr/>
+        </p:nvPicPr>
+        <p:blipFill>
+          <a:blip r:embed="rId8" cstate="print">
+            <a:extLst>
+              <a:ext uri="{28A0092B-C50C-407E-A947-70E740481C1C}">
+                <a14:useLocalDpi xmlns:a14="http://schemas.microsoft.com/office/drawing/2010/main" val="0"/>
+              </a:ext>
+            </a:extLst>
+          </a:blip>
+          <a:srcRect/>
+          <a:stretch>
+            <a:fillRect/>
+          </a:stretch>
+        </p:blipFill>
+        <p:spPr bwMode="auto">
+          <a:xfrm>
+            <a:off x="2971800" y="2986649"/>
+            <a:ext cx="1679719" cy="1679719"/>
           </a:xfrm>
           <a:prstGeom prst="rect">
             <a:avLst/>
@@ -6087,15 +6199,7 @@
                   <a:schemeClr val="bg1"/>
                 </a:solidFill>
               </a:rPr>
-              <a:t>open-loop machines</a:t>
-            </a:r>
-            <a:r>
-              <a:rPr lang="en-US" dirty="0" smtClean="0">
-                <a:solidFill>
-                  <a:schemeClr val="bg1"/>
-                </a:solidFill>
-              </a:rPr>
-              <a:t>. KNOWING your inaccuracies in each axis is important</a:t>
+              <a:t>open-loop machines. KNOWING your inaccuracies in each axis is important</a:t>
             </a:r>
             <a:endParaRPr lang="en-US" dirty="0">
               <a:solidFill>

</xml_diff>